<commit_message>
fixed 2nd diagram again
</commit_message>
<xml_diff>
--- a/Diagrams.pptx
+++ b/Diagrams.pptx
@@ -3893,82 +3893,36 @@
           </p:txBody>
         </p:sp>
       </p:grpSp>
-      <p:sp>
-        <p:nvSpPr>
-          <p:cNvPr id="34" name="Arc 33"/>
-          <p:cNvSpPr/>
-          <p:nvPr/>
-        </p:nvSpPr>
-        <p:spPr>
-          <a:xfrm>
-            <a:off x="5793149" y="2135549"/>
-            <a:ext cx="683851" cy="683851"/>
-          </a:xfrm>
-          <a:prstGeom prst="arc">
-            <a:avLst>
-              <a:gd name="adj1" fmla="val 14268561"/>
-              <a:gd name="adj2" fmla="val 1970188"/>
-            </a:avLst>
-          </a:prstGeom>
-          <a:ln w="25400">
-            <a:solidFill>
-              <a:schemeClr val="tx1">
-                <a:lumMod val="65000"/>
-                <a:lumOff val="35000"/>
-              </a:schemeClr>
-            </a:solidFill>
-          </a:ln>
-        </p:spPr>
-        <p:style>
-          <a:lnRef idx="1">
-            <a:schemeClr val="accent1"/>
-          </a:lnRef>
-          <a:fillRef idx="0">
-            <a:schemeClr val="accent1"/>
-          </a:fillRef>
-          <a:effectRef idx="0">
-            <a:schemeClr val="accent1"/>
-          </a:effectRef>
-          <a:fontRef idx="minor">
-            <a:schemeClr val="tx1"/>
-          </a:fontRef>
-        </p:style>
-        <p:txBody>
-          <a:bodyPr rtlCol="0" anchor="ctr"/>
-          <a:lstStyle/>
-          <a:p>
-            <a:pPr algn="ctr"/>
-            <a:endParaRPr lang="en-US"/>
-          </a:p>
-        </p:txBody>
-      </p:sp>
       <p:grpSp>
         <p:nvGrpSpPr>
-          <p:cNvPr id="122" name="Group 121"/>
+          <p:cNvPr id="2" name="Group 1"/>
           <p:cNvGrpSpPr/>
           <p:nvPr/>
         </p:nvGrpSpPr>
         <p:grpSpPr>
           <a:xfrm>
-            <a:off x="5947410" y="1761744"/>
-            <a:ext cx="1261872" cy="905256"/>
-            <a:chOff x="5947410" y="1761744"/>
-            <a:chExt cx="1261872" cy="905256"/>
+            <a:off x="5793149" y="1761744"/>
+            <a:ext cx="1416133" cy="1057656"/>
+            <a:chOff x="5793149" y="1761744"/>
+            <a:chExt cx="1416133" cy="1057656"/>
           </a:xfrm>
         </p:grpSpPr>
-        <p:cxnSp>
-          <p:nvCxnSpPr>
-            <p:cNvPr id="39" name="Straight Connector 38"/>
-            <p:cNvCxnSpPr/>
+        <p:sp>
+          <p:nvSpPr>
+            <p:cNvPr id="34" name="Arc 33"/>
+            <p:cNvSpPr/>
             <p:nvPr/>
-          </p:nvCxnSpPr>
+          </p:nvSpPr>
           <p:spPr>
-            <a:xfrm flipH="1">
-              <a:off x="6265795" y="1855470"/>
-              <a:ext cx="824615" cy="0"/>
+            <a:xfrm>
+              <a:off x="5793149" y="2135549"/>
+              <a:ext cx="683851" cy="683851"/>
             </a:xfrm>
-            <a:prstGeom prst="line">
-              <a:avLst/>
+            <a:prstGeom prst="arc">
+              <a:avLst>
+                <a:gd name="adj1" fmla="val 14268561"/>
+                <a:gd name="adj2" fmla="val 1970188"/>
+              </a:avLst>
             </a:prstGeom>
             <a:ln w="25400">
               <a:solidFill>
@@ -3993,191 +3947,6 @@
               <a:schemeClr val="tx1"/>
             </a:fontRef>
           </p:style>
-        </p:cxnSp>
-        <p:cxnSp>
-          <p:nvCxnSpPr>
-            <p:cNvPr id="41" name="Straight Connector 40"/>
-            <p:cNvCxnSpPr/>
-            <p:nvPr/>
-          </p:nvCxnSpPr>
-          <p:spPr>
-            <a:xfrm flipV="1">
-              <a:off x="6277225" y="1855470"/>
-              <a:ext cx="0" cy="304800"/>
-            </a:xfrm>
-            <a:prstGeom prst="line">
-              <a:avLst/>
-            </a:prstGeom>
-            <a:ln w="25400">
-              <a:solidFill>
-                <a:schemeClr val="tx1">
-                  <a:lumMod val="65000"/>
-                  <a:lumOff val="35000"/>
-                </a:schemeClr>
-              </a:solidFill>
-            </a:ln>
-          </p:spPr>
-          <p:style>
-            <a:lnRef idx="1">
-              <a:schemeClr val="accent1"/>
-            </a:lnRef>
-            <a:fillRef idx="0">
-              <a:schemeClr val="accent1"/>
-            </a:fillRef>
-            <a:effectRef idx="0">
-              <a:schemeClr val="accent1"/>
-            </a:effectRef>
-            <a:fontRef idx="minor">
-              <a:schemeClr val="tx1"/>
-            </a:fontRef>
-          </p:style>
-        </p:cxnSp>
-        <p:cxnSp>
-          <p:nvCxnSpPr>
-            <p:cNvPr id="46" name="Straight Connector 45"/>
-            <p:cNvCxnSpPr/>
-            <p:nvPr/>
-          </p:nvCxnSpPr>
-          <p:spPr>
-            <a:xfrm flipV="1">
-              <a:off x="7077325" y="1866959"/>
-              <a:ext cx="0" cy="495241"/>
-            </a:xfrm>
-            <a:prstGeom prst="line">
-              <a:avLst/>
-            </a:prstGeom>
-            <a:ln w="25400">
-              <a:solidFill>
-                <a:schemeClr val="tx1">
-                  <a:lumMod val="65000"/>
-                  <a:lumOff val="35000"/>
-                </a:schemeClr>
-              </a:solidFill>
-            </a:ln>
-          </p:spPr>
-          <p:style>
-            <a:lnRef idx="1">
-              <a:schemeClr val="accent1"/>
-            </a:lnRef>
-            <a:fillRef idx="0">
-              <a:schemeClr val="accent1"/>
-            </a:fillRef>
-            <a:effectRef idx="0">
-              <a:schemeClr val="accent1"/>
-            </a:effectRef>
-            <a:fontRef idx="minor">
-              <a:schemeClr val="tx1"/>
-            </a:fontRef>
-          </p:style>
-        </p:cxnSp>
-        <p:cxnSp>
-          <p:nvCxnSpPr>
-            <p:cNvPr id="49" name="Straight Connector 48"/>
-            <p:cNvCxnSpPr/>
-            <p:nvPr/>
-          </p:nvCxnSpPr>
-          <p:spPr>
-            <a:xfrm flipH="1">
-              <a:off x="6457950" y="2353100"/>
-              <a:ext cx="630936" cy="0"/>
-            </a:xfrm>
-            <a:prstGeom prst="line">
-              <a:avLst/>
-            </a:prstGeom>
-            <a:ln w="25400">
-              <a:solidFill>
-                <a:schemeClr val="tx1">
-                  <a:lumMod val="65000"/>
-                  <a:lumOff val="35000"/>
-                </a:schemeClr>
-              </a:solidFill>
-            </a:ln>
-          </p:spPr>
-          <p:style>
-            <a:lnRef idx="1">
-              <a:schemeClr val="accent1"/>
-            </a:lnRef>
-            <a:fillRef idx="0">
-              <a:schemeClr val="accent1"/>
-            </a:fillRef>
-            <a:effectRef idx="0">
-              <a:schemeClr val="accent1"/>
-            </a:effectRef>
-            <a:fontRef idx="minor">
-              <a:schemeClr val="tx1"/>
-            </a:fontRef>
-          </p:style>
-        </p:cxnSp>
-        <p:cxnSp>
-          <p:nvCxnSpPr>
-            <p:cNvPr id="52" name="Straight Connector 51"/>
-            <p:cNvCxnSpPr/>
-            <p:nvPr/>
-          </p:nvCxnSpPr>
-          <p:spPr>
-            <a:xfrm flipV="1">
-              <a:off x="6934200" y="2353100"/>
-              <a:ext cx="142297" cy="313900"/>
-            </a:xfrm>
-            <a:prstGeom prst="line">
-              <a:avLst/>
-            </a:prstGeom>
-            <a:ln w="25400">
-              <a:solidFill>
-                <a:schemeClr val="tx1">
-                  <a:lumMod val="65000"/>
-                  <a:lumOff val="35000"/>
-                </a:schemeClr>
-              </a:solidFill>
-            </a:ln>
-          </p:spPr>
-          <p:style>
-            <a:lnRef idx="1">
-              <a:schemeClr val="accent1"/>
-            </a:lnRef>
-            <a:fillRef idx="0">
-              <a:schemeClr val="accent1"/>
-            </a:fillRef>
-            <a:effectRef idx="0">
-              <a:schemeClr val="accent1"/>
-            </a:effectRef>
-            <a:fontRef idx="minor">
-              <a:schemeClr val="tx1"/>
-            </a:fontRef>
-          </p:style>
-        </p:cxnSp>
-        <p:sp>
-          <p:nvSpPr>
-            <p:cNvPr id="33" name="Rectangle 32"/>
-            <p:cNvSpPr/>
-            <p:nvPr/>
-          </p:nvSpPr>
-          <p:spPr>
-            <a:xfrm>
-              <a:off x="5947410" y="1761744"/>
-              <a:ext cx="1261872" cy="896112"/>
-            </a:xfrm>
-            <a:prstGeom prst="rect">
-              <a:avLst/>
-            </a:prstGeom>
-            <a:noFill/>
-          </p:spPr>
-          <p:style>
-            <a:lnRef idx="2">
-              <a:schemeClr val="accent1">
-                <a:shade val="50000"/>
-              </a:schemeClr>
-            </a:lnRef>
-            <a:fillRef idx="1">
-              <a:schemeClr val="accent1"/>
-            </a:fillRef>
-            <a:effectRef idx="0">
-              <a:schemeClr val="accent1"/>
-            </a:effectRef>
-            <a:fontRef idx="minor">
-              <a:schemeClr val="lt1"/>
-            </a:fontRef>
-          </p:style>
           <p:txBody>
             <a:bodyPr rtlCol="0" anchor="ctr"/>
             <a:lstStyle/>
@@ -4187,93 +3956,339 @@
             </a:p>
           </p:txBody>
         </p:sp>
-        <p:sp>
-          <p:nvSpPr>
-            <p:cNvPr id="54" name="TextBox 53"/>
-            <p:cNvSpPr txBox="1"/>
+        <p:grpSp>
+          <p:nvGrpSpPr>
+            <p:cNvPr id="122" name="Group 121"/>
+            <p:cNvGrpSpPr/>
             <p:nvPr/>
-          </p:nvSpPr>
-          <p:spPr>
+          </p:nvGrpSpPr>
+          <p:grpSpPr>
             <a:xfrm>
-              <a:off x="6381750" y="1866900"/>
-              <a:ext cx="609600" cy="461665"/>
+              <a:off x="5947410" y="1761744"/>
+              <a:ext cx="1261872" cy="905256"/>
+              <a:chOff x="5947410" y="1761744"/>
+              <a:chExt cx="1261872" cy="905256"/>
             </a:xfrm>
-            <a:prstGeom prst="rect">
-              <a:avLst/>
-            </a:prstGeom>
-            <a:noFill/>
-          </p:spPr>
-          <p:txBody>
-            <a:bodyPr wrap="square" rtlCol="0">
-              <a:spAutoFit/>
-            </a:bodyPr>
-            <a:lstStyle/>
-            <a:p>
-              <a:pPr algn="ctr"/>
-              <a:r>
-                <a:rPr lang="en-US" sz="800" dirty="0" smtClean="0">
+          </p:grpSpPr>
+          <p:cxnSp>
+            <p:nvCxnSpPr>
+              <p:cNvPr id="39" name="Straight Connector 38"/>
+              <p:cNvCxnSpPr/>
+              <p:nvPr/>
+            </p:nvCxnSpPr>
+            <p:spPr>
+              <a:xfrm flipH="1">
+                <a:off x="6265795" y="1855470"/>
+                <a:ext cx="824615" cy="0"/>
+              </a:xfrm>
+              <a:prstGeom prst="line">
+                <a:avLst/>
+              </a:prstGeom>
+              <a:ln w="25400">
+                <a:solidFill>
+                  <a:schemeClr val="tx1">
+                    <a:lumMod val="65000"/>
+                    <a:lumOff val="35000"/>
+                  </a:schemeClr>
+                </a:solidFill>
+              </a:ln>
+            </p:spPr>
+            <p:style>
+              <a:lnRef idx="1">
+                <a:schemeClr val="accent1"/>
+              </a:lnRef>
+              <a:fillRef idx="0">
+                <a:schemeClr val="accent1"/>
+              </a:fillRef>
+              <a:effectRef idx="0">
+                <a:schemeClr val="accent1"/>
+              </a:effectRef>
+              <a:fontRef idx="minor">
+                <a:schemeClr val="tx1"/>
+              </a:fontRef>
+            </p:style>
+          </p:cxnSp>
+          <p:cxnSp>
+            <p:nvCxnSpPr>
+              <p:cNvPr id="41" name="Straight Connector 40"/>
+              <p:cNvCxnSpPr/>
+              <p:nvPr/>
+            </p:nvCxnSpPr>
+            <p:spPr>
+              <a:xfrm flipV="1">
+                <a:off x="6277225" y="1855470"/>
+                <a:ext cx="0" cy="304800"/>
+              </a:xfrm>
+              <a:prstGeom prst="line">
+                <a:avLst/>
+              </a:prstGeom>
+              <a:ln w="25400">
+                <a:solidFill>
+                  <a:schemeClr val="tx1">
+                    <a:lumMod val="65000"/>
+                    <a:lumOff val="35000"/>
+                  </a:schemeClr>
+                </a:solidFill>
+              </a:ln>
+            </p:spPr>
+            <p:style>
+              <a:lnRef idx="1">
+                <a:schemeClr val="accent1"/>
+              </a:lnRef>
+              <a:fillRef idx="0">
+                <a:schemeClr val="accent1"/>
+              </a:fillRef>
+              <a:effectRef idx="0">
+                <a:schemeClr val="accent1"/>
+              </a:effectRef>
+              <a:fontRef idx="minor">
+                <a:schemeClr val="tx1"/>
+              </a:fontRef>
+            </p:style>
+          </p:cxnSp>
+          <p:cxnSp>
+            <p:nvCxnSpPr>
+              <p:cNvPr id="46" name="Straight Connector 45"/>
+              <p:cNvCxnSpPr/>
+              <p:nvPr/>
+            </p:nvCxnSpPr>
+            <p:spPr>
+              <a:xfrm flipV="1">
+                <a:off x="7077325" y="1866959"/>
+                <a:ext cx="0" cy="495241"/>
+              </a:xfrm>
+              <a:prstGeom prst="line">
+                <a:avLst/>
+              </a:prstGeom>
+              <a:ln w="25400">
+                <a:solidFill>
+                  <a:schemeClr val="tx1">
+                    <a:lumMod val="65000"/>
+                    <a:lumOff val="35000"/>
+                  </a:schemeClr>
+                </a:solidFill>
+              </a:ln>
+            </p:spPr>
+            <p:style>
+              <a:lnRef idx="1">
+                <a:schemeClr val="accent1"/>
+              </a:lnRef>
+              <a:fillRef idx="0">
+                <a:schemeClr val="accent1"/>
+              </a:fillRef>
+              <a:effectRef idx="0">
+                <a:schemeClr val="accent1"/>
+              </a:effectRef>
+              <a:fontRef idx="minor">
+                <a:schemeClr val="tx1"/>
+              </a:fontRef>
+            </p:style>
+          </p:cxnSp>
+          <p:cxnSp>
+            <p:nvCxnSpPr>
+              <p:cNvPr id="49" name="Straight Connector 48"/>
+              <p:cNvCxnSpPr/>
+              <p:nvPr/>
+            </p:nvCxnSpPr>
+            <p:spPr>
+              <a:xfrm flipH="1">
+                <a:off x="6457950" y="2353100"/>
+                <a:ext cx="630936" cy="0"/>
+              </a:xfrm>
+              <a:prstGeom prst="line">
+                <a:avLst/>
+              </a:prstGeom>
+              <a:ln w="25400">
+                <a:solidFill>
+                  <a:schemeClr val="tx1">
+                    <a:lumMod val="65000"/>
+                    <a:lumOff val="35000"/>
+                  </a:schemeClr>
+                </a:solidFill>
+              </a:ln>
+            </p:spPr>
+            <p:style>
+              <a:lnRef idx="1">
+                <a:schemeClr val="accent1"/>
+              </a:lnRef>
+              <a:fillRef idx="0">
+                <a:schemeClr val="accent1"/>
+              </a:fillRef>
+              <a:effectRef idx="0">
+                <a:schemeClr val="accent1"/>
+              </a:effectRef>
+              <a:fontRef idx="minor">
+                <a:schemeClr val="tx1"/>
+              </a:fontRef>
+            </p:style>
+          </p:cxnSp>
+          <p:cxnSp>
+            <p:nvCxnSpPr>
+              <p:cNvPr id="52" name="Straight Connector 51"/>
+              <p:cNvCxnSpPr/>
+              <p:nvPr/>
+            </p:nvCxnSpPr>
+            <p:spPr>
+              <a:xfrm flipV="1">
+                <a:off x="6934200" y="2353100"/>
+                <a:ext cx="142297" cy="313900"/>
+              </a:xfrm>
+              <a:prstGeom prst="line">
+                <a:avLst/>
+              </a:prstGeom>
+              <a:ln w="25400">
+                <a:solidFill>
+                  <a:schemeClr val="tx1">
+                    <a:lumMod val="65000"/>
+                    <a:lumOff val="35000"/>
+                  </a:schemeClr>
+                </a:solidFill>
+              </a:ln>
+            </p:spPr>
+            <p:style>
+              <a:lnRef idx="1">
+                <a:schemeClr val="accent1"/>
+              </a:lnRef>
+              <a:fillRef idx="0">
+                <a:schemeClr val="accent1"/>
+              </a:fillRef>
+              <a:effectRef idx="0">
+                <a:schemeClr val="accent1"/>
+              </a:effectRef>
+              <a:fontRef idx="minor">
+                <a:schemeClr val="tx1"/>
+              </a:fontRef>
+            </p:style>
+          </p:cxnSp>
+          <p:sp>
+            <p:nvSpPr>
+              <p:cNvPr id="33" name="Rectangle 32"/>
+              <p:cNvSpPr/>
+              <p:nvPr/>
+            </p:nvSpPr>
+            <p:spPr>
+              <a:xfrm>
+                <a:off x="5947410" y="1761744"/>
+                <a:ext cx="1261872" cy="896112"/>
+              </a:xfrm>
+              <a:prstGeom prst="rect">
+                <a:avLst/>
+              </a:prstGeom>
+              <a:noFill/>
+            </p:spPr>
+            <p:style>
+              <a:lnRef idx="2">
+                <a:schemeClr val="accent1">
+                  <a:shade val="50000"/>
+                </a:schemeClr>
+              </a:lnRef>
+              <a:fillRef idx="1">
+                <a:schemeClr val="accent1"/>
+              </a:fillRef>
+              <a:effectRef idx="0">
+                <a:schemeClr val="accent1"/>
+              </a:effectRef>
+              <a:fontRef idx="minor">
+                <a:schemeClr val="lt1"/>
+              </a:fontRef>
+            </p:style>
+            <p:txBody>
+              <a:bodyPr rtlCol="0" anchor="ctr"/>
+              <a:lstStyle/>
+              <a:p>
+                <a:pPr algn="ctr"/>
+                <a:endParaRPr lang="en-US"/>
+              </a:p>
+            </p:txBody>
+          </p:sp>
+          <p:sp>
+            <p:nvSpPr>
+              <p:cNvPr id="54" name="TextBox 53"/>
+              <p:cNvSpPr txBox="1"/>
+              <p:nvPr/>
+            </p:nvSpPr>
+            <p:spPr>
+              <a:xfrm>
+                <a:off x="6381750" y="1866900"/>
+                <a:ext cx="609600" cy="461665"/>
+              </a:xfrm>
+              <a:prstGeom prst="rect">
+                <a:avLst/>
+              </a:prstGeom>
+              <a:noFill/>
+            </p:spPr>
+            <p:txBody>
+              <a:bodyPr wrap="square" rtlCol="0">
+                <a:spAutoFit/>
+              </a:bodyPr>
+              <a:lstStyle/>
+              <a:p>
+                <a:pPr algn="ctr"/>
+                <a:r>
+                  <a:rPr lang="en-US" sz="800" dirty="0" smtClean="0">
+                    <a:solidFill>
+                      <a:schemeClr val="tx1">
+                        <a:lumMod val="65000"/>
+                        <a:lumOff val="35000"/>
+                      </a:schemeClr>
+                    </a:solidFill>
+                  </a:rPr>
+                  <a:t>Patient 1</a:t>
+                </a:r>
+                <a:br>
+                  <a:rPr lang="en-US" sz="800" dirty="0" smtClean="0">
+                    <a:solidFill>
+                      <a:schemeClr val="tx1">
+                        <a:lumMod val="65000"/>
+                        <a:lumOff val="35000"/>
+                      </a:schemeClr>
+                    </a:solidFill>
+                  </a:rPr>
+                </a:br>
+                <a:r>
+                  <a:rPr lang="en-US" sz="800" dirty="0" smtClean="0">
+                    <a:solidFill>
+                      <a:schemeClr val="tx1">
+                        <a:lumMod val="65000"/>
+                        <a:lumOff val="35000"/>
+                      </a:schemeClr>
+                    </a:solidFill>
+                  </a:rPr>
+                  <a:t>Patient 2</a:t>
+                </a:r>
+                <a:br>
+                  <a:rPr lang="en-US" sz="800" dirty="0" smtClean="0">
+                    <a:solidFill>
+                      <a:schemeClr val="tx1">
+                        <a:lumMod val="65000"/>
+                        <a:lumOff val="35000"/>
+                      </a:schemeClr>
+                    </a:solidFill>
+                  </a:rPr>
+                </a:br>
+                <a:r>
+                  <a:rPr lang="en-US" sz="800" dirty="0" smtClean="0">
+                    <a:solidFill>
+                      <a:schemeClr val="tx1">
+                        <a:lumMod val="65000"/>
+                        <a:lumOff val="35000"/>
+                      </a:schemeClr>
+                    </a:solidFill>
+                  </a:rPr>
+                  <a:t>Patient 3</a:t>
+                </a:r>
+                <a:endParaRPr lang="en-US" sz="800" dirty="0">
                   <a:solidFill>
                     <a:schemeClr val="tx1">
                       <a:lumMod val="65000"/>
                       <a:lumOff val="35000"/>
                     </a:schemeClr>
                   </a:solidFill>
-                </a:rPr>
-                <a:t>Patient 1</a:t>
-              </a:r>
-              <a:br>
-                <a:rPr lang="en-US" sz="800" dirty="0" smtClean="0">
-                  <a:solidFill>
-                    <a:schemeClr val="tx1">
-                      <a:lumMod val="65000"/>
-                      <a:lumOff val="35000"/>
-                    </a:schemeClr>
-                  </a:solidFill>
-                </a:rPr>
-              </a:br>
-              <a:r>
-                <a:rPr lang="en-US" sz="800" dirty="0" smtClean="0">
-                  <a:solidFill>
-                    <a:schemeClr val="tx1">
-                      <a:lumMod val="65000"/>
-                      <a:lumOff val="35000"/>
-                    </a:schemeClr>
-                  </a:solidFill>
-                </a:rPr>
-                <a:t>Patient 2</a:t>
-              </a:r>
-              <a:br>
-                <a:rPr lang="en-US" sz="800" dirty="0" smtClean="0">
-                  <a:solidFill>
-                    <a:schemeClr val="tx1">
-                      <a:lumMod val="65000"/>
-                      <a:lumOff val="35000"/>
-                    </a:schemeClr>
-                  </a:solidFill>
-                </a:rPr>
-              </a:br>
-              <a:r>
-                <a:rPr lang="en-US" sz="800" dirty="0" smtClean="0">
-                  <a:solidFill>
-                    <a:schemeClr val="tx1">
-                      <a:lumMod val="65000"/>
-                      <a:lumOff val="35000"/>
-                    </a:schemeClr>
-                  </a:solidFill>
-                </a:rPr>
-                <a:t>Patient 3</a:t>
-              </a:r>
-              <a:endParaRPr lang="en-US" sz="800" dirty="0">
-                <a:solidFill>
-                  <a:schemeClr val="tx1">
-                    <a:lumMod val="65000"/>
-                    <a:lumOff val="35000"/>
-                  </a:schemeClr>
-                </a:solidFill>
-              </a:endParaRPr>
-            </a:p>
-          </p:txBody>
-        </p:sp>
+                </a:endParaRPr>
+              </a:p>
+            </p:txBody>
+          </p:sp>
+        </p:grpSp>
       </p:grpSp>
       <p:sp>
         <p:nvSpPr>

</xml_diff>